<commit_message>
fix: switch clausula to objeto in `comandosDDL.pptx`
</commit_message>
<xml_diff>
--- a/Aula 05/ComandosDDL.pptx
+++ b/Aula 05/ComandosDDL.pptx
@@ -408,7 +408,7 @@
           <a:p>
             <a:fld id="{E2588FEF-F436-4522-91D9-3FBB4B3CDA67}" type="datetimeFigureOut">
               <a:rPr lang="pt-BR" smtClean="0"/>
-              <a:t>10/02/2026</a:t>
+              <a:t>16/02/2026</a:t>
             </a:fld>
             <a:endParaRPr lang="pt-BR"/>
           </a:p>
@@ -906,7 +906,7 @@
           <a:p>
             <a:fld id="{8ADEC918-6A4C-437B-AF1C-9622FE800873}" type="datetimeFigureOut">
               <a:rPr lang="pt-BR" smtClean="0"/>
-              <a:t>10/02/2026</a:t>
+              <a:t>16/02/2026</a:t>
             </a:fld>
             <a:endParaRPr lang="pt-BR"/>
           </a:p>
@@ -1104,7 +1104,7 @@
           <a:p>
             <a:fld id="{8ADEC918-6A4C-437B-AF1C-9622FE800873}" type="datetimeFigureOut">
               <a:rPr lang="pt-BR" smtClean="0"/>
-              <a:t>10/02/2026</a:t>
+              <a:t>16/02/2026</a:t>
             </a:fld>
             <a:endParaRPr lang="pt-BR"/>
           </a:p>
@@ -1312,7 +1312,7 @@
           <a:p>
             <a:fld id="{8ADEC918-6A4C-437B-AF1C-9622FE800873}" type="datetimeFigureOut">
               <a:rPr lang="pt-BR" smtClean="0"/>
-              <a:t>10/02/2026</a:t>
+              <a:t>16/02/2026</a:t>
             </a:fld>
             <a:endParaRPr lang="pt-BR"/>
           </a:p>
@@ -1510,7 +1510,7 @@
           <a:p>
             <a:fld id="{8ADEC918-6A4C-437B-AF1C-9622FE800873}" type="datetimeFigureOut">
               <a:rPr lang="pt-BR" smtClean="0"/>
-              <a:t>10/02/2026</a:t>
+              <a:t>16/02/2026</a:t>
             </a:fld>
             <a:endParaRPr lang="pt-BR"/>
           </a:p>
@@ -1785,7 +1785,7 @@
           <a:p>
             <a:fld id="{8ADEC918-6A4C-437B-AF1C-9622FE800873}" type="datetimeFigureOut">
               <a:rPr lang="pt-BR" smtClean="0"/>
-              <a:t>10/02/2026</a:t>
+              <a:t>16/02/2026</a:t>
             </a:fld>
             <a:endParaRPr lang="pt-BR"/>
           </a:p>
@@ -2050,7 +2050,7 @@
           <a:p>
             <a:fld id="{8ADEC918-6A4C-437B-AF1C-9622FE800873}" type="datetimeFigureOut">
               <a:rPr lang="pt-BR" smtClean="0"/>
-              <a:t>10/02/2026</a:t>
+              <a:t>16/02/2026</a:t>
             </a:fld>
             <a:endParaRPr lang="pt-BR"/>
           </a:p>
@@ -2462,7 +2462,7 @@
           <a:p>
             <a:fld id="{8ADEC918-6A4C-437B-AF1C-9622FE800873}" type="datetimeFigureOut">
               <a:rPr lang="pt-BR" smtClean="0"/>
-              <a:t>10/02/2026</a:t>
+              <a:t>16/02/2026</a:t>
             </a:fld>
             <a:endParaRPr lang="pt-BR"/>
           </a:p>
@@ -2603,7 +2603,7 @@
           <a:p>
             <a:fld id="{8ADEC918-6A4C-437B-AF1C-9622FE800873}" type="datetimeFigureOut">
               <a:rPr lang="pt-BR" smtClean="0"/>
-              <a:t>10/02/2026</a:t>
+              <a:t>16/02/2026</a:t>
             </a:fld>
             <a:endParaRPr lang="pt-BR"/>
           </a:p>
@@ -2716,7 +2716,7 @@
           <a:p>
             <a:fld id="{8ADEC918-6A4C-437B-AF1C-9622FE800873}" type="datetimeFigureOut">
               <a:rPr lang="pt-BR" smtClean="0"/>
-              <a:t>10/02/2026</a:t>
+              <a:t>16/02/2026</a:t>
             </a:fld>
             <a:endParaRPr lang="pt-BR"/>
           </a:p>
@@ -3027,7 +3027,7 @@
           <a:p>
             <a:fld id="{8ADEC918-6A4C-437B-AF1C-9622FE800873}" type="datetimeFigureOut">
               <a:rPr lang="pt-BR" smtClean="0"/>
-              <a:t>10/02/2026</a:t>
+              <a:t>16/02/2026</a:t>
             </a:fld>
             <a:endParaRPr lang="pt-BR"/>
           </a:p>
@@ -3315,7 +3315,7 @@
           <a:p>
             <a:fld id="{8ADEC918-6A4C-437B-AF1C-9622FE800873}" type="datetimeFigureOut">
               <a:rPr lang="pt-BR" smtClean="0"/>
-              <a:t>10/02/2026</a:t>
+              <a:t>16/02/2026</a:t>
             </a:fld>
             <a:endParaRPr lang="pt-BR"/>
           </a:p>
@@ -3556,7 +3556,7 @@
           <a:p>
             <a:fld id="{8ADEC918-6A4C-437B-AF1C-9622FE800873}" type="datetimeFigureOut">
               <a:rPr lang="pt-BR" smtClean="0"/>
-              <a:t>10/02/2026</a:t>
+              <a:t>16/02/2026</a:t>
             </a:fld>
             <a:endParaRPr lang="pt-BR"/>
           </a:p>
@@ -8420,7 +8420,7 @@
                   <a:srgbClr val="FF0000"/>
                 </a:solidFill>
               </a:rPr>
-              <a:t>Cláusula</a:t>
+              <a:t>Objeto</a:t>
             </a:r>
             <a:endParaRPr lang="pt-BR" dirty="0">
               <a:solidFill>
@@ -8649,7 +8649,7 @@
             </a:r>
             <a:r>
               <a:rPr lang="en-US" sz="2800" u="sng" dirty="0" err="1"/>
-              <a:t>cláusulas</a:t>
+              <a:t>objetos</a:t>
             </a:r>
             <a:r>
               <a:rPr lang="en-US" sz="2800" dirty="0"/>
@@ -8697,8 +8697,8 @@
           </a:prstGeom>
         </p:spPr>
       </p:pic>
-      <mc:AlternateContent xmlns:mc="http://schemas.openxmlformats.org/markup-compatibility/2006">
-        <mc:Choice xmlns:p14="http://schemas.microsoft.com/office/powerpoint/2010/main" Requires="p14">
+      <mc:AlternateContent xmlns:mc="http://schemas.openxmlformats.org/markup-compatibility/2006" xmlns:p14="http://schemas.microsoft.com/office/powerpoint/2010/main">
+        <mc:Choice Requires="p14">
           <p:contentPart p14:bwMode="auto" r:id="rId4">
             <p14:nvContentPartPr>
               <p14:cNvPr id="9" name="Tinta 8">
@@ -8717,7 +8717,7 @@
             </p14:xfrm>
           </p:contentPart>
         </mc:Choice>
-        <mc:Fallback>
+        <mc:Fallback xmlns="">
           <p:pic>
             <p:nvPicPr>
               <p:cNvPr id="9" name="Tinta 8">
@@ -8748,8 +8748,8 @@
           </p:pic>
         </mc:Fallback>
       </mc:AlternateContent>
-      <mc:AlternateContent xmlns:mc="http://schemas.openxmlformats.org/markup-compatibility/2006">
-        <mc:Choice xmlns:p14="http://schemas.microsoft.com/office/powerpoint/2010/main" Requires="p14">
+      <mc:AlternateContent xmlns:mc="http://schemas.openxmlformats.org/markup-compatibility/2006" xmlns:p14="http://schemas.microsoft.com/office/powerpoint/2010/main">
+        <mc:Choice Requires="p14">
           <p:contentPart p14:bwMode="auto" r:id="rId6">
             <p14:nvContentPartPr>
               <p14:cNvPr id="10" name="Tinta 9">
@@ -8768,7 +8768,7 @@
             </p14:xfrm>
           </p:contentPart>
         </mc:Choice>
-        <mc:Fallback>
+        <mc:Fallback xmlns="">
           <p:pic>
             <p:nvPicPr>
               <p:cNvPr id="10" name="Tinta 9">
@@ -8799,8 +8799,8 @@
           </p:pic>
         </mc:Fallback>
       </mc:AlternateContent>
-      <mc:AlternateContent xmlns:mc="http://schemas.openxmlformats.org/markup-compatibility/2006">
-        <mc:Choice xmlns:p14="http://schemas.microsoft.com/office/powerpoint/2010/main" Requires="p14">
+      <mc:AlternateContent xmlns:mc="http://schemas.openxmlformats.org/markup-compatibility/2006" xmlns:p14="http://schemas.microsoft.com/office/powerpoint/2010/main">
+        <mc:Choice Requires="p14">
           <p:contentPart p14:bwMode="auto" r:id="rId8">
             <p14:nvContentPartPr>
               <p14:cNvPr id="11" name="Tinta 10">
@@ -8819,7 +8819,7 @@
             </p14:xfrm>
           </p:contentPart>
         </mc:Choice>
-        <mc:Fallback>
+        <mc:Fallback xmlns="">
           <p:pic>
             <p:nvPicPr>
               <p:cNvPr id="11" name="Tinta 10">
@@ -8864,7 +8864,7 @@
         </p:nvSpPr>
         <p:spPr>
           <a:xfrm>
-            <a:off x="4402677" y="3244334"/>
+            <a:off x="4543602" y="3233264"/>
             <a:ext cx="1047240" cy="369332"/>
           </a:xfrm>
           <a:prstGeom prst="rect">
@@ -8884,7 +8884,7 @@
                   <a:srgbClr val="FF0000"/>
                 </a:solidFill>
               </a:rPr>
-              <a:t>Cláusula</a:t>
+              <a:t>Objeto</a:t>
             </a:r>
             <a:endParaRPr lang="pt-BR" b="1" dirty="0">
               <a:solidFill>
@@ -8908,7 +8908,7 @@
         </p:nvSpPr>
         <p:spPr>
           <a:xfrm>
-            <a:off x="3938496" y="4586202"/>
+            <a:off x="4019982" y="4577230"/>
             <a:ext cx="1047240" cy="369332"/>
           </a:xfrm>
           <a:prstGeom prst="rect">
@@ -8928,7 +8928,7 @@
                   <a:srgbClr val="FF0000"/>
                 </a:solidFill>
               </a:rPr>
-              <a:t>Cláusula</a:t>
+              <a:t>Objeto</a:t>
             </a:r>
             <a:endParaRPr lang="pt-BR" b="1" dirty="0">
               <a:solidFill>
@@ -8952,7 +8952,7 @@
         </p:nvSpPr>
         <p:spPr>
           <a:xfrm>
-            <a:off x="4026170" y="5931936"/>
+            <a:off x="4113845" y="5930722"/>
             <a:ext cx="1047240" cy="369332"/>
           </a:xfrm>
           <a:prstGeom prst="rect">
@@ -8972,7 +8972,7 @@
                   <a:srgbClr val="FF0000"/>
                 </a:solidFill>
               </a:rPr>
-              <a:t>Cláusula</a:t>
+              <a:t>Objeto</a:t>
             </a:r>
             <a:endParaRPr lang="pt-BR" b="1" dirty="0">
               <a:solidFill>
@@ -9141,7 +9141,7 @@
             </a:r>
             <a:r>
               <a:rPr lang="en-US" sz="2800" u="sng" dirty="0" err="1"/>
-              <a:t>cláusulas</a:t>
+              <a:t>objetos</a:t>
             </a:r>
             <a:r>
               <a:rPr lang="en-US" sz="2800" dirty="0"/>
@@ -9561,11 +9561,19 @@
             </a:r>
             <a:r>
               <a:rPr lang="en-US" sz="2000" dirty="0"/>
-              <a:t> à </a:t>
+              <a:t> </a:t>
             </a:r>
             <a:r>
               <a:rPr lang="en-US" sz="2000" dirty="0" err="1"/>
-              <a:t>cláusula</a:t>
+              <a:t>ao</a:t>
+            </a:r>
+            <a:r>
+              <a:rPr lang="en-US" sz="2000" dirty="0"/>
+              <a:t> </a:t>
+            </a:r>
+            <a:r>
+              <a:rPr lang="en-US" sz="2000" dirty="0" err="1"/>
+              <a:t>objeto</a:t>
             </a:r>
             <a:endParaRPr lang="pt-BR" sz="2000" dirty="0"/>
           </a:p>
@@ -9628,7 +9636,7 @@
         </p:nvSpPr>
         <p:spPr>
           <a:xfrm>
-            <a:off x="1870182" y="3221276"/>
+            <a:off x="1956908" y="3221276"/>
             <a:ext cx="1047240" cy="369332"/>
           </a:xfrm>
           <a:prstGeom prst="rect">
@@ -9648,7 +9656,7 @@
                   <a:srgbClr val="FF0000"/>
                 </a:solidFill>
               </a:rPr>
-              <a:t>Cláusula</a:t>
+              <a:t>Objeto</a:t>
             </a:r>
             <a:endParaRPr lang="pt-BR" b="1" dirty="0">
               <a:solidFill>
@@ -9658,8 +9666,8 @@
           </a:p>
         </p:txBody>
       </p:sp>
-      <mc:AlternateContent xmlns:mc="http://schemas.openxmlformats.org/markup-compatibility/2006">
-        <mc:Choice xmlns:p14="http://schemas.microsoft.com/office/powerpoint/2010/main" Requires="p14">
+      <mc:AlternateContent xmlns:mc="http://schemas.openxmlformats.org/markup-compatibility/2006" xmlns:p14="http://schemas.microsoft.com/office/powerpoint/2010/main">
+        <mc:Choice Requires="p14">
           <p:contentPart p14:bwMode="auto" r:id="rId4">
             <p14:nvContentPartPr>
               <p14:cNvPr id="19" name="Tinta 18">
@@ -9678,7 +9686,7 @@
             </p14:xfrm>
           </p:contentPart>
         </mc:Choice>
-        <mc:Fallback>
+        <mc:Fallback xmlns="">
           <p:pic>
             <p:nvPicPr>
               <p:cNvPr id="19" name="Tinta 18">
@@ -9876,7 +9884,7 @@
             </a:r>
             <a:r>
               <a:rPr lang="en-US" sz="2800" u="sng" dirty="0" err="1"/>
-              <a:t>cláusulas</a:t>
+              <a:t>Objetos</a:t>
             </a:r>
             <a:r>
               <a:rPr lang="en-US" sz="2800" dirty="0"/>
@@ -9924,8 +9932,8 @@
           </a:prstGeom>
         </p:spPr>
       </p:pic>
-      <mc:AlternateContent xmlns:mc="http://schemas.openxmlformats.org/markup-compatibility/2006">
-        <mc:Choice xmlns:p14="http://schemas.microsoft.com/office/powerpoint/2010/main" Requires="p14">
+      <mc:AlternateContent xmlns:mc="http://schemas.openxmlformats.org/markup-compatibility/2006" xmlns:p14="http://schemas.microsoft.com/office/powerpoint/2010/main">
+        <mc:Choice Requires="p14">
           <p:contentPart p14:bwMode="auto" r:id="rId4">
             <p14:nvContentPartPr>
               <p14:cNvPr id="8" name="Tinta 7">
@@ -9944,7 +9952,7 @@
             </p14:xfrm>
           </p:contentPart>
         </mc:Choice>
-        <mc:Fallback>
+        <mc:Fallback xmlns="">
           <p:pic>
             <p:nvPicPr>
               <p:cNvPr id="8" name="Tinta 7">
@@ -9989,7 +9997,7 @@
         </p:nvSpPr>
         <p:spPr>
           <a:xfrm>
-            <a:off x="4533206" y="3083117"/>
+            <a:off x="4619795" y="3136329"/>
             <a:ext cx="1047240" cy="369332"/>
           </a:xfrm>
           <a:prstGeom prst="rect">
@@ -10009,7 +10017,7 @@
                   <a:srgbClr val="FF0000"/>
                 </a:solidFill>
               </a:rPr>
-              <a:t>Cláusula</a:t>
+              <a:t>Objetos</a:t>
             </a:r>
             <a:endParaRPr lang="pt-BR" b="1" dirty="0">
               <a:solidFill>
@@ -10019,8 +10027,8 @@
           </a:p>
         </p:txBody>
       </p:sp>
-      <mc:AlternateContent xmlns:mc="http://schemas.openxmlformats.org/markup-compatibility/2006">
-        <mc:Choice xmlns:p14="http://schemas.microsoft.com/office/powerpoint/2010/main" Requires="p14">
+      <mc:AlternateContent xmlns:mc="http://schemas.openxmlformats.org/markup-compatibility/2006" xmlns:p14="http://schemas.microsoft.com/office/powerpoint/2010/main">
+        <mc:Choice Requires="p14">
           <p:contentPart p14:bwMode="auto" r:id="rId6">
             <p14:nvContentPartPr>
               <p14:cNvPr id="11" name="Tinta 10">
@@ -10039,7 +10047,7 @@
             </p14:xfrm>
           </p:contentPart>
         </mc:Choice>
-        <mc:Fallback>
+        <mc:Fallback xmlns="">
           <p:pic>
             <p:nvPicPr>
               <p:cNvPr id="11" name="Tinta 10">
@@ -10084,7 +10092,7 @@
         </p:nvSpPr>
         <p:spPr>
           <a:xfrm>
-            <a:off x="4096175" y="4580740"/>
+            <a:off x="4166514" y="4580740"/>
             <a:ext cx="1047240" cy="369332"/>
           </a:xfrm>
           <a:prstGeom prst="rect">
@@ -10104,7 +10112,7 @@
                   <a:srgbClr val="FF0000"/>
                 </a:solidFill>
               </a:rPr>
-              <a:t>Cláusula</a:t>
+              <a:t>Objetos</a:t>
             </a:r>
             <a:endParaRPr lang="pt-BR" b="1" dirty="0">
               <a:solidFill>
@@ -10128,7 +10136,7 @@
         </p:nvSpPr>
         <p:spPr>
           <a:xfrm>
-            <a:off x="4055753" y="6078003"/>
+            <a:off x="4096175" y="6078003"/>
             <a:ext cx="1047240" cy="369332"/>
           </a:xfrm>
           <a:prstGeom prst="rect">
@@ -10148,7 +10156,7 @@
                   <a:srgbClr val="FF0000"/>
                 </a:solidFill>
               </a:rPr>
-              <a:t>Cláusula</a:t>
+              <a:t>Objetos</a:t>
             </a:r>
             <a:endParaRPr lang="pt-BR" b="1" dirty="0">
               <a:solidFill>
@@ -10158,8 +10166,8 @@
           </a:p>
         </p:txBody>
       </p:sp>
-      <mc:AlternateContent xmlns:mc="http://schemas.openxmlformats.org/markup-compatibility/2006">
-        <mc:Choice xmlns:p14="http://schemas.microsoft.com/office/powerpoint/2010/main" Requires="p14">
+      <mc:AlternateContent xmlns:mc="http://schemas.openxmlformats.org/markup-compatibility/2006" xmlns:p14="http://schemas.microsoft.com/office/powerpoint/2010/main">
+        <mc:Choice Requires="p14">
           <p:contentPart p14:bwMode="auto" r:id="rId8">
             <p14:nvContentPartPr>
               <p14:cNvPr id="19" name="Tinta 18">
@@ -10178,7 +10186,7 @@
             </p14:xfrm>
           </p:contentPart>
         </mc:Choice>
-        <mc:Fallback>
+        <mc:Fallback xmlns="">
           <p:pic>
             <p:nvPicPr>
               <p:cNvPr id="19" name="Tinta 18">

</xml_diff>